<commit_message>
AddExpenseSequenceDiagram: fix out of alignment objects
</commit_message>
<xml_diff>
--- a/docs/diagrams/AddExpenseSequenceDiagram.pptx
+++ b/docs/diagrams/AddExpenseSequenceDiagram.pptx
@@ -104,6 +104,11 @@
       </a:defRPr>
     </a:lvl9pPr>
   </p:defaultTextStyle>
+  <p:extLst>
+    <p:ext uri="{EFAFB233-063F-42B5-8137-9DF3F51BA10A}">
+      <p15:sldGuideLst xmlns:p15="http://schemas.microsoft.com/office/powerpoint/2012/main"/>
+    </p:ext>
+  </p:extLst>
 </p:presentation>
 </file>
 
@@ -256,7 +261,7 @@
           <a:p>
             <a:fld id="{1F525CDF-8D0F-4BFC-8500-2B6571FC4D7D}" type="datetimeFigureOut">
               <a:rPr lang="en-GB" smtClean="0"/>
-              <a:t>11/11/2018</a:t>
+              <a:t>12/11/2018</a:t>
             </a:fld>
             <a:endParaRPr lang="en-GB"/>
           </a:p>
@@ -456,7 +461,7 @@
           <a:p>
             <a:fld id="{1F525CDF-8D0F-4BFC-8500-2B6571FC4D7D}" type="datetimeFigureOut">
               <a:rPr lang="en-GB" smtClean="0"/>
-              <a:t>11/11/2018</a:t>
+              <a:t>12/11/2018</a:t>
             </a:fld>
             <a:endParaRPr lang="en-GB"/>
           </a:p>
@@ -666,7 +671,7 @@
           <a:p>
             <a:fld id="{1F525CDF-8D0F-4BFC-8500-2B6571FC4D7D}" type="datetimeFigureOut">
               <a:rPr lang="en-GB" smtClean="0"/>
-              <a:t>11/11/2018</a:t>
+              <a:t>12/11/2018</a:t>
             </a:fld>
             <a:endParaRPr lang="en-GB"/>
           </a:p>
@@ -866,7 +871,7 @@
           <a:p>
             <a:fld id="{1F525CDF-8D0F-4BFC-8500-2B6571FC4D7D}" type="datetimeFigureOut">
               <a:rPr lang="en-GB" smtClean="0"/>
-              <a:t>11/11/2018</a:t>
+              <a:t>12/11/2018</a:t>
             </a:fld>
             <a:endParaRPr lang="en-GB"/>
           </a:p>
@@ -1142,7 +1147,7 @@
           <a:p>
             <a:fld id="{1F525CDF-8D0F-4BFC-8500-2B6571FC4D7D}" type="datetimeFigureOut">
               <a:rPr lang="en-GB" smtClean="0"/>
-              <a:t>11/11/2018</a:t>
+              <a:t>12/11/2018</a:t>
             </a:fld>
             <a:endParaRPr lang="en-GB"/>
           </a:p>
@@ -1410,7 +1415,7 @@
           <a:p>
             <a:fld id="{1F525CDF-8D0F-4BFC-8500-2B6571FC4D7D}" type="datetimeFigureOut">
               <a:rPr lang="en-GB" smtClean="0"/>
-              <a:t>11/11/2018</a:t>
+              <a:t>12/11/2018</a:t>
             </a:fld>
             <a:endParaRPr lang="en-GB"/>
           </a:p>
@@ -1825,7 +1830,7 @@
           <a:p>
             <a:fld id="{1F525CDF-8D0F-4BFC-8500-2B6571FC4D7D}" type="datetimeFigureOut">
               <a:rPr lang="en-GB" smtClean="0"/>
-              <a:t>11/11/2018</a:t>
+              <a:t>12/11/2018</a:t>
             </a:fld>
             <a:endParaRPr lang="en-GB"/>
           </a:p>
@@ -1967,7 +1972,7 @@
           <a:p>
             <a:fld id="{1F525CDF-8D0F-4BFC-8500-2B6571FC4D7D}" type="datetimeFigureOut">
               <a:rPr lang="en-GB" smtClean="0"/>
-              <a:t>11/11/2018</a:t>
+              <a:t>12/11/2018</a:t>
             </a:fld>
             <a:endParaRPr lang="en-GB"/>
           </a:p>
@@ -2080,7 +2085,7 @@
           <a:p>
             <a:fld id="{1F525CDF-8D0F-4BFC-8500-2B6571FC4D7D}" type="datetimeFigureOut">
               <a:rPr lang="en-GB" smtClean="0"/>
-              <a:t>11/11/2018</a:t>
+              <a:t>12/11/2018</a:t>
             </a:fld>
             <a:endParaRPr lang="en-GB"/>
           </a:p>
@@ -2393,7 +2398,7 @@
           <a:p>
             <a:fld id="{1F525CDF-8D0F-4BFC-8500-2B6571FC4D7D}" type="datetimeFigureOut">
               <a:rPr lang="en-GB" smtClean="0"/>
-              <a:t>11/11/2018</a:t>
+              <a:t>12/11/2018</a:t>
             </a:fld>
             <a:endParaRPr lang="en-GB"/>
           </a:p>
@@ -2682,7 +2687,7 @@
           <a:p>
             <a:fld id="{1F525CDF-8D0F-4BFC-8500-2B6571FC4D7D}" type="datetimeFigureOut">
               <a:rPr lang="en-GB" smtClean="0"/>
-              <a:t>11/11/2018</a:t>
+              <a:t>12/11/2018</a:t>
             </a:fld>
             <a:endParaRPr lang="en-GB"/>
           </a:p>
@@ -2925,7 +2930,7 @@
           <a:p>
             <a:fld id="{1F525CDF-8D0F-4BFC-8500-2B6571FC4D7D}" type="datetimeFigureOut">
               <a:rPr lang="en-GB" smtClean="0"/>
-              <a:t>11/11/2018</a:t>
+              <a:t>12/11/2018</a:t>
             </a:fld>
             <a:endParaRPr lang="en-GB"/>
           </a:p>
@@ -3356,8 +3361,8 @@
         </p:nvSpPr>
         <p:spPr>
           <a:xfrm>
-            <a:off x="2870908" y="397438"/>
-            <a:ext cx="1357863" cy="5859923"/>
+            <a:off x="2870908" y="499037"/>
+            <a:ext cx="1357863" cy="5282004"/>
           </a:xfrm>
           <a:prstGeom prst="roundRect">
             <a:avLst>
@@ -3568,7 +3573,7 @@
         <p:spPr>
           <a:xfrm>
             <a:off x="9118435" y="499036"/>
-            <a:ext cx="2123445" cy="5859923"/>
+            <a:ext cx="2123445" cy="5282005"/>
           </a:xfrm>
           <a:prstGeom prst="roundRect">
             <a:avLst>
@@ -3751,13 +3756,14 @@
           </p:cNvPr>
           <p:cNvCxnSpPr>
             <a:cxnSpLocks/>
+            <a:endCxn id="48" idx="2"/>
           </p:cNvCxnSpPr>
           <p:nvPr/>
         </p:nvCxnSpPr>
         <p:spPr>
           <a:xfrm>
             <a:off x="10171405" y="1793203"/>
-            <a:ext cx="44170" cy="3598625"/>
+            <a:ext cx="8753" cy="3987838"/>
           </a:xfrm>
           <a:prstGeom prst="line">
             <a:avLst/>
@@ -3811,7 +3817,7 @@
         <p:spPr>
           <a:xfrm>
             <a:off x="6774095" y="499036"/>
-            <a:ext cx="2123445" cy="5859923"/>
+            <a:ext cx="2123445" cy="5282005"/>
           </a:xfrm>
           <a:prstGeom prst="roundRect">
             <a:avLst>
@@ -3994,13 +4000,14 @@
           </p:cNvPr>
           <p:cNvCxnSpPr>
             <a:cxnSpLocks/>
+            <a:endCxn id="24" idx="2"/>
           </p:cNvCxnSpPr>
           <p:nvPr/>
         </p:nvCxnSpPr>
         <p:spPr>
           <a:xfrm>
             <a:off x="7830142" y="1031902"/>
-            <a:ext cx="33347" cy="4446031"/>
+            <a:ext cx="5676" cy="4749139"/>
           </a:xfrm>
           <a:prstGeom prst="line">
             <a:avLst/>
@@ -4053,8 +4060,8 @@
         </p:nvSpPr>
         <p:spPr>
           <a:xfrm>
-            <a:off x="4429755" y="499037"/>
-            <a:ext cx="2123445" cy="5859923"/>
+            <a:off x="4429755" y="499038"/>
+            <a:ext cx="2123445" cy="5282004"/>
           </a:xfrm>
           <a:prstGeom prst="roundRect">
             <a:avLst>
@@ -4233,13 +4240,14 @@
           </p:cNvPr>
           <p:cNvCxnSpPr>
             <a:cxnSpLocks/>
+            <a:endCxn id="14" idx="2"/>
           </p:cNvCxnSpPr>
           <p:nvPr/>
         </p:nvCxnSpPr>
         <p:spPr>
-          <a:xfrm rot="60000">
-            <a:off x="5468553" y="1139048"/>
-            <a:ext cx="67314" cy="4458234"/>
+          <a:xfrm flipH="1">
+            <a:off x="5491478" y="1138800"/>
+            <a:ext cx="15984" cy="4642242"/>
           </a:xfrm>
           <a:prstGeom prst="line">
             <a:avLst/>
@@ -4476,13 +4484,14 @@
           </p:cNvPr>
           <p:cNvCxnSpPr>
             <a:cxnSpLocks/>
+            <a:endCxn id="4" idx="2"/>
           </p:cNvCxnSpPr>
           <p:nvPr/>
         </p:nvCxnSpPr>
         <p:spPr>
           <a:xfrm>
             <a:off x="3513626" y="1205282"/>
-            <a:ext cx="49146" cy="4392000"/>
+            <a:ext cx="36214" cy="4575759"/>
           </a:xfrm>
           <a:prstGeom prst="line">
             <a:avLst/>

</xml_diff>